<commit_message>
2017 - 05 - 25	Ver 1.0.1	문서 레이아웃 수정	임현
</commit_message>
<xml_diff>
--- a/doc/3_ 설계서/Class Design_6_blossom.pptx
+++ b/doc/3_ 설계서/Class Design_6_blossom.pptx
@@ -1110,7 +1110,7 @@
           <p:nvPr userDrawn="1">
             <p:extLst>
               <p:ext uri="{D42A27DB-BD31-4B8C-83A1-F6EECF244321}">
-                <p14:modId xmlns:p14="http://schemas.microsoft.com/office/powerpoint/2010/main" val="3385421182"/>
+                <p14:modId xmlns:p14="http://schemas.microsoft.com/office/powerpoint/2010/main" val="2848931998"/>
               </p:ext>
             </p:extLst>
           </p:nvPr>
@@ -1271,6 +1271,20 @@
                         <a:buNone/>
                         <a:tabLst/>
                       </a:pPr>
+                      <a:r>
+                        <a:rPr kumimoji="1" lang="en-US" altLang="ko-KR" sz="900" b="0" i="0" u="none" strike="noStrike" cap="none" normalizeH="0" baseline="0" dirty="0">
+                          <a:ln>
+                            <a:noFill/>
+                          </a:ln>
+                          <a:solidFill>
+                            <a:schemeClr val="tx1"/>
+                          </a:solidFill>
+                          <a:effectLst/>
+                          <a:latin typeface="맑은 고딕" pitchFamily="50" charset="-127"/>
+                          <a:ea typeface="맑은 고딕" pitchFamily="50" charset="-127"/>
+                        </a:rPr>
+                        <a:t>To do List</a:t>
+                      </a:r>
                       <a:endParaRPr kumimoji="1" lang="ko-KR" altLang="ko-KR" sz="900" b="0" i="0" u="none" strike="noStrike" cap="none" normalizeH="0" baseline="0" dirty="0">
                         <a:ln>
                           <a:noFill/>
@@ -1459,21 +1473,7 @@
                           <a:latin typeface="맑은 고딕" pitchFamily="50" charset="-127"/>
                           <a:ea typeface="맑은 고딕" pitchFamily="50" charset="-127"/>
                         </a:rPr>
-                        <a:t>Class </a:t>
-                      </a:r>
-                      <a:r>
-                        <a:rPr kumimoji="1" lang="ko-KR" altLang="en-US" sz="900" b="0" i="0" u="none" strike="noStrike" cap="none" normalizeH="0" baseline="0" dirty="0">
-                          <a:ln>
-                            <a:noFill/>
-                          </a:ln>
-                          <a:solidFill>
-                            <a:schemeClr val="tx1"/>
-                          </a:solidFill>
-                          <a:effectLst/>
-                          <a:latin typeface="맑은 고딕" pitchFamily="50" charset="-127"/>
-                          <a:ea typeface="맑은 고딕" pitchFamily="50" charset="-127"/>
-                        </a:rPr>
-                        <a:t>설계서</a:t>
+                        <a:t>Class Design_6_blossom.pptx</a:t>
                       </a:r>
                       <a:endParaRPr kumimoji="1" lang="ko-KR" sz="900" b="0" i="0" u="none" strike="noStrike" cap="none" normalizeH="0" baseline="0" dirty="0">
                         <a:ln>
@@ -1832,7 +1832,7 @@
                           <a:latin typeface="맑은 고딕" pitchFamily="50" charset="-127"/>
                           <a:ea typeface="맑은 고딕" pitchFamily="50" charset="-127"/>
                         </a:rPr>
-                        <a:t>V X.X</a:t>
+                        <a:t>Ver 1.0.1.</a:t>
                       </a:r>
                       <a:endParaRPr kumimoji="1" lang="ko-KR" altLang="ko-KR" sz="900" b="0" i="0" u="none" strike="noStrike" cap="none" normalizeH="0" baseline="0" dirty="0">
                         <a:ln>
@@ -1950,10 +1950,9 @@
           <a:p>
             <a:pPr algn="r"/>
             <a:r>
-              <a:rPr lang="ko-KR" altLang="en-US" dirty="0"/>
-              <a:t>팀 명</a:t>
+              <a:rPr lang="en-US" altLang="ko-KR" dirty="0"/>
+              <a:t>Blossom</a:t>
             </a:r>
-            <a:endParaRPr lang="en-US" altLang="ko-KR" dirty="0"/>
           </a:p>
         </p:txBody>
       </p:sp>
@@ -2278,8 +2277,8 @@
           <a:p>
             <a:pPr algn="r"/>
             <a:r>
-              <a:rPr lang="ko-KR" altLang="en-US" dirty="0"/>
-              <a:t>팀 명</a:t>
+              <a:rPr lang="en-US" altLang="ko-KR"/>
+              <a:t>Blossom</a:t>
             </a:r>
             <a:endParaRPr lang="en-US" altLang="ko-KR" dirty="0"/>
           </a:p>
@@ -2483,8 +2482,8 @@
           <a:p>
             <a:pPr algn="r"/>
             <a:r>
-              <a:rPr lang="ko-KR" altLang="en-US" dirty="0"/>
-              <a:t>팀 명</a:t>
+              <a:rPr lang="en-US" altLang="ko-KR"/>
+              <a:t>Blossom</a:t>
             </a:r>
             <a:endParaRPr lang="en-US" altLang="ko-KR" dirty="0"/>
           </a:p>
@@ -3153,7 +3152,7 @@
             <p:ph idx="1"/>
             <p:extLst>
               <p:ext uri="{D42A27DB-BD31-4B8C-83A1-F6EECF244321}">
-                <p14:modId xmlns:p14="http://schemas.microsoft.com/office/powerpoint/2010/main" val="3505709117"/>
+                <p14:modId xmlns:p14="http://schemas.microsoft.com/office/powerpoint/2010/main" val="3486366064"/>
               </p:ext>
             </p:extLst>
           </p:nvPr>
@@ -3393,7 +3392,7 @@
                     <a:bodyPr/>
                     <a:lstStyle/>
                     <a:p>
-                      <a:pPr latinLnBrk="1"/>
+                      <a:pPr algn="ctr" latinLnBrk="1"/>
                       <a:r>
                         <a:rPr lang="ko-KR" altLang="en-US" sz="1200" b="0" dirty="0" err="1">
                           <a:solidFill>
@@ -3479,6 +3478,16 @@
                     <a:lstStyle/>
                     <a:p>
                       <a:pPr algn="ctr" latinLnBrk="1"/>
+                      <a:r>
+                        <a:rPr lang="en-US" altLang="ko-KR" sz="1200" b="0" dirty="0">
+                          <a:solidFill>
+                            <a:schemeClr val="tx1"/>
+                          </a:solidFill>
+                          <a:latin typeface="맑은 고딕" pitchFamily="50" charset="-127"/>
+                          <a:ea typeface="맑은 고딕" pitchFamily="50" charset="-127"/>
+                        </a:rPr>
+                        <a:t>2017 – 05 – 25</a:t>
+                      </a:r>
                       <a:endParaRPr lang="ko-KR" altLang="en-US" sz="1200" b="0" dirty="0">
                         <a:solidFill>
                           <a:schemeClr val="tx1"/>
@@ -3500,6 +3509,16 @@
                     <a:lstStyle/>
                     <a:p>
                       <a:pPr algn="ctr" latinLnBrk="1"/>
+                      <a:r>
+                        <a:rPr lang="en-US" altLang="ko-KR" sz="1200" b="0" dirty="0">
+                          <a:solidFill>
+                            <a:schemeClr val="tx1"/>
+                          </a:solidFill>
+                          <a:latin typeface="맑은 고딕" pitchFamily="50" charset="-127"/>
+                          <a:ea typeface="맑은 고딕" pitchFamily="50" charset="-127"/>
+                        </a:rPr>
+                        <a:t>Ver 1.0.1.</a:t>
+                      </a:r>
                       <a:endParaRPr lang="ko-KR" altLang="en-US" sz="1200" b="0" dirty="0">
                         <a:solidFill>
                           <a:schemeClr val="tx1"/>
@@ -3520,14 +3539,17 @@
                     <a:bodyPr/>
                     <a:lstStyle/>
                     <a:p>
-                      <a:pPr latinLnBrk="1"/>
-                      <a:endParaRPr lang="ko-KR" altLang="en-US" sz="1200" b="0">
-                        <a:solidFill>
-                          <a:schemeClr val="tx1"/>
-                        </a:solidFill>
-                        <a:latin typeface="맑은 고딕" pitchFamily="50" charset="-127"/>
-                        <a:ea typeface="맑은 고딕" pitchFamily="50" charset="-127"/>
-                      </a:endParaRPr>
+                      <a:pPr algn="ctr" latinLnBrk="1"/>
+                      <a:r>
+                        <a:rPr lang="ko-KR" altLang="en-US" sz="1200" b="0" dirty="0">
+                          <a:solidFill>
+                            <a:schemeClr val="tx1"/>
+                          </a:solidFill>
+                          <a:latin typeface="맑은 고딕" pitchFamily="50" charset="-127"/>
+                          <a:ea typeface="맑은 고딕" pitchFamily="50" charset="-127"/>
+                        </a:rPr>
+                        <a:t>문서 레이아웃 수정</a:t>
+                      </a:r>
                     </a:p>
                   </a:txBody>
                   <a:tcPr anchor="ctr">
@@ -3542,13 +3564,16 @@
                     <a:lstStyle/>
                     <a:p>
                       <a:pPr algn="ctr" latinLnBrk="1"/>
-                      <a:endParaRPr lang="ko-KR" altLang="en-US" sz="1200" b="0" dirty="0">
-                        <a:solidFill>
-                          <a:schemeClr val="tx1"/>
-                        </a:solidFill>
-                        <a:latin typeface="맑은 고딕" pitchFamily="50" charset="-127"/>
-                        <a:ea typeface="맑은 고딕" pitchFamily="50" charset="-127"/>
-                      </a:endParaRPr>
+                      <a:r>
+                        <a:rPr lang="ko-KR" altLang="en-US" sz="1200" b="0" dirty="0">
+                          <a:solidFill>
+                            <a:schemeClr val="tx1"/>
+                          </a:solidFill>
+                          <a:latin typeface="맑은 고딕" pitchFamily="50" charset="-127"/>
+                          <a:ea typeface="맑은 고딕" pitchFamily="50" charset="-127"/>
+                        </a:rPr>
+                        <a:t>임현</a:t>
+                      </a:r>
                     </a:p>
                   </a:txBody>
                   <a:tcPr anchor="ctr">
@@ -3611,8 +3636,8 @@
                     <a:bodyPr/>
                     <a:lstStyle/>
                     <a:p>
-                      <a:pPr latinLnBrk="1"/>
-                      <a:endParaRPr lang="ko-KR" altLang="en-US" sz="1200" b="0">
+                      <a:pPr algn="ctr" latinLnBrk="1"/>
+                      <a:endParaRPr lang="ko-KR" altLang="en-US" sz="1200" b="0" dirty="0">
                         <a:solidFill>
                           <a:schemeClr val="tx1"/>
                         </a:solidFill>
@@ -3702,7 +3727,7 @@
                     <a:bodyPr/>
                     <a:lstStyle/>
                     <a:p>
-                      <a:pPr latinLnBrk="1"/>
+                      <a:pPr algn="ctr" latinLnBrk="1"/>
                       <a:endParaRPr lang="ko-KR" altLang="en-US" sz="1200" b="0" dirty="0">
                         <a:solidFill>
                           <a:schemeClr val="tx1"/>
@@ -3793,7 +3818,7 @@
                     <a:bodyPr/>
                     <a:lstStyle/>
                     <a:p>
-                      <a:pPr latinLnBrk="1"/>
+                      <a:pPr algn="ctr" latinLnBrk="1"/>
                       <a:endParaRPr lang="ko-KR" altLang="en-US" sz="1200" b="0" dirty="0">
                         <a:solidFill>
                           <a:schemeClr val="tx1"/>
@@ -3884,7 +3909,7 @@
                     <a:bodyPr/>
                     <a:lstStyle/>
                     <a:p>
-                      <a:pPr latinLnBrk="1"/>
+                      <a:pPr algn="ctr" latinLnBrk="1"/>
                       <a:endParaRPr lang="ko-KR" altLang="en-US" sz="1200" b="0" dirty="0">
                         <a:solidFill>
                           <a:schemeClr val="tx1"/>
@@ -3975,7 +4000,7 @@
                     <a:bodyPr/>
                     <a:lstStyle/>
                     <a:p>
-                      <a:pPr latinLnBrk="1"/>
+                      <a:pPr algn="ctr" latinLnBrk="1"/>
                       <a:endParaRPr lang="ko-KR" altLang="en-US" sz="1200" b="0" dirty="0">
                         <a:solidFill>
                           <a:schemeClr val="tx1"/>
@@ -4064,8 +4089,8 @@
           <a:p>
             <a:pPr algn="r"/>
             <a:r>
-              <a:rPr lang="ko-KR" altLang="en-US" dirty="0"/>
-              <a:t>팀 명</a:t>
+              <a:rPr lang="en-US" altLang="ko-KR"/>
+              <a:t>Blossom</a:t>
             </a:r>
             <a:endParaRPr lang="en-US" altLang="ko-KR" dirty="0"/>
           </a:p>

</xml_diff>